<commit_message>
Update colors in diagrams
</commit_message>
<xml_diff>
--- a/doc/Diagrams.pptx
+++ b/doc/Diagrams.pptx
@@ -194,7 +194,7 @@
           <a:p>
             <a:fld id="{F5CC4B3F-88C1-4FFA-B1B6-F41C21DC6924}" type="datetimeFigureOut">
               <a:rPr lang="en-US" smtClean="0"/>
-              <a:t>9/12/2016</a:t>
+              <a:t>9/18/2016</a:t>
             </a:fld>
             <a:endParaRPr lang="en-US"/>
           </a:p>
@@ -727,7 +727,7 @@
           <a:p>
             <a:fld id="{78C97017-6FC3-485B-9764-EAC9E56C1D49}" type="datetimeFigureOut">
               <a:rPr lang="en-US" smtClean="0"/>
-              <a:t>9/12/2016</a:t>
+              <a:t>9/18/2016</a:t>
             </a:fld>
             <a:endParaRPr lang="en-US"/>
           </a:p>
@@ -897,7 +897,7 @@
           <a:p>
             <a:fld id="{78C97017-6FC3-485B-9764-EAC9E56C1D49}" type="datetimeFigureOut">
               <a:rPr lang="en-US" smtClean="0"/>
-              <a:t>9/12/2016</a:t>
+              <a:t>9/18/2016</a:t>
             </a:fld>
             <a:endParaRPr lang="en-US"/>
           </a:p>
@@ -1077,7 +1077,7 @@
           <a:p>
             <a:fld id="{78C97017-6FC3-485B-9764-EAC9E56C1D49}" type="datetimeFigureOut">
               <a:rPr lang="en-US" smtClean="0"/>
-              <a:t>9/12/2016</a:t>
+              <a:t>9/18/2016</a:t>
             </a:fld>
             <a:endParaRPr lang="en-US"/>
           </a:p>
@@ -1247,7 +1247,7 @@
           <a:p>
             <a:fld id="{78C97017-6FC3-485B-9764-EAC9E56C1D49}" type="datetimeFigureOut">
               <a:rPr lang="en-US" smtClean="0"/>
-              <a:t>9/12/2016</a:t>
+              <a:t>9/18/2016</a:t>
             </a:fld>
             <a:endParaRPr lang="en-US"/>
           </a:p>
@@ -1493,7 +1493,7 @@
           <a:p>
             <a:fld id="{78C97017-6FC3-485B-9764-EAC9E56C1D49}" type="datetimeFigureOut">
               <a:rPr lang="en-US" smtClean="0"/>
-              <a:t>9/12/2016</a:t>
+              <a:t>9/18/2016</a:t>
             </a:fld>
             <a:endParaRPr lang="en-US"/>
           </a:p>
@@ -1781,7 +1781,7 @@
           <a:p>
             <a:fld id="{78C97017-6FC3-485B-9764-EAC9E56C1D49}" type="datetimeFigureOut">
               <a:rPr lang="en-US" smtClean="0"/>
-              <a:t>9/12/2016</a:t>
+              <a:t>9/18/2016</a:t>
             </a:fld>
             <a:endParaRPr lang="en-US"/>
           </a:p>
@@ -2203,7 +2203,7 @@
           <a:p>
             <a:fld id="{78C97017-6FC3-485B-9764-EAC9E56C1D49}" type="datetimeFigureOut">
               <a:rPr lang="en-US" smtClean="0"/>
-              <a:t>9/12/2016</a:t>
+              <a:t>9/18/2016</a:t>
             </a:fld>
             <a:endParaRPr lang="en-US"/>
           </a:p>
@@ -2321,7 +2321,7 @@
           <a:p>
             <a:fld id="{78C97017-6FC3-485B-9764-EAC9E56C1D49}" type="datetimeFigureOut">
               <a:rPr lang="en-US" smtClean="0"/>
-              <a:t>9/12/2016</a:t>
+              <a:t>9/18/2016</a:t>
             </a:fld>
             <a:endParaRPr lang="en-US"/>
           </a:p>
@@ -2416,7 +2416,7 @@
           <a:p>
             <a:fld id="{78C97017-6FC3-485B-9764-EAC9E56C1D49}" type="datetimeFigureOut">
               <a:rPr lang="en-US" smtClean="0"/>
-              <a:t>9/12/2016</a:t>
+              <a:t>9/18/2016</a:t>
             </a:fld>
             <a:endParaRPr lang="en-US"/>
           </a:p>
@@ -2693,7 +2693,7 @@
           <a:p>
             <a:fld id="{78C97017-6FC3-485B-9764-EAC9E56C1D49}" type="datetimeFigureOut">
               <a:rPr lang="en-US" smtClean="0"/>
-              <a:t>9/12/2016</a:t>
+              <a:t>9/18/2016</a:t>
             </a:fld>
             <a:endParaRPr lang="en-US"/>
           </a:p>
@@ -2946,7 +2946,7 @@
           <a:p>
             <a:fld id="{78C97017-6FC3-485B-9764-EAC9E56C1D49}" type="datetimeFigureOut">
               <a:rPr lang="en-US" smtClean="0"/>
-              <a:t>9/12/2016</a:t>
+              <a:t>9/18/2016</a:t>
             </a:fld>
             <a:endParaRPr lang="en-US"/>
           </a:p>
@@ -3159,7 +3159,7 @@
           <a:p>
             <a:fld id="{78C97017-6FC3-485B-9764-EAC9E56C1D49}" type="datetimeFigureOut">
               <a:rPr lang="en-US" smtClean="0"/>
-              <a:t>9/12/2016</a:t>
+              <a:t>9/18/2016</a:t>
             </a:fld>
             <a:endParaRPr lang="en-US"/>
           </a:p>
@@ -6926,7 +6926,7 @@
         </p:nvSpPr>
         <p:spPr>
           <a:xfrm>
-            <a:off x="2410207" y="4460471"/>
+            <a:off x="2414826" y="4460471"/>
             <a:ext cx="790193" cy="346760"/>
           </a:xfrm>
           <a:prstGeom prst="rect">
@@ -6987,9 +6987,9 @@
           <p:nvPr/>
         </p:nvCxnSpPr>
         <p:spPr>
-          <a:xfrm rot="5400000">
-            <a:off x="2646817" y="4301983"/>
-            <a:ext cx="316975" cy="12700"/>
+          <a:xfrm rot="16200000" flipH="1">
+            <a:off x="2651435" y="4301982"/>
+            <a:ext cx="316975" cy="1"/>
           </a:xfrm>
           <a:prstGeom prst="bentConnector3">
             <a:avLst>
@@ -7028,7 +7028,7 @@
         </p:nvSpPr>
         <p:spPr>
           <a:xfrm>
-            <a:off x="2410208" y="3700884"/>
+            <a:off x="2414826" y="3700884"/>
             <a:ext cx="790192" cy="442612"/>
           </a:xfrm>
           <a:prstGeom prst="rect">
@@ -7142,7 +7142,7 @@
         <p:spPr>
           <a:xfrm flipV="1">
             <a:off x="1704592" y="3922190"/>
-            <a:ext cx="705616" cy="6349"/>
+            <a:ext cx="710234" cy="6349"/>
           </a:xfrm>
           <a:prstGeom prst="bentConnector3">
             <a:avLst>
@@ -7185,8 +7185,8 @@
         </p:nvCxnSpPr>
         <p:spPr>
           <a:xfrm rot="16200000" flipH="1">
-            <a:off x="1617848" y="3841492"/>
-            <a:ext cx="484006" cy="1100711"/>
+            <a:off x="1620158" y="3839183"/>
+            <a:ext cx="484006" cy="1105330"/>
           </a:xfrm>
           <a:prstGeom prst="bentConnector2">
             <a:avLst/>
@@ -7231,11 +7231,11 @@
             <a:avLst/>
           </a:prstGeom>
           <a:solidFill>
-            <a:srgbClr val="00B050"/>
+            <a:srgbClr val="0070C0"/>
           </a:solidFill>
           <a:ln w="19050">
             <a:solidFill>
-              <a:srgbClr val="00B050"/>
+              <a:srgbClr val="0070C0"/>
             </a:solidFill>
           </a:ln>
           <a:effectLst/>
@@ -7260,7 +7260,7 @@
           <a:p>
             <a:pPr algn="ctr"/>
             <a:r>
-              <a:rPr lang="en-US" sz="1050" dirty="0" smtClean="0">
+              <a:rPr lang="en-US" sz="1050" dirty="0">
                 <a:solidFill>
                   <a:schemeClr val="bg1"/>
                 </a:solidFill>
@@ -7268,14 +7268,14 @@
               <a:t>{abstract}</a:t>
             </a:r>
             <a:br>
-              <a:rPr lang="en-US" sz="1050" dirty="0" smtClean="0">
+              <a:rPr lang="en-US" sz="1050" dirty="0">
                 <a:solidFill>
                   <a:schemeClr val="bg1"/>
                 </a:solidFill>
               </a:rPr>
             </a:br>
             <a:r>
-              <a:rPr lang="en-US" sz="1050" dirty="0" smtClean="0">
+              <a:rPr lang="en-US" sz="1050" dirty="0">
                 <a:solidFill>
                   <a:schemeClr val="bg1"/>
                 </a:solidFill>
@@ -7300,9 +7300,9 @@
           <p:nvPr/>
         </p:nvCxnSpPr>
         <p:spPr>
-          <a:xfrm rot="5400000">
-            <a:off x="6067401" y="4280707"/>
-            <a:ext cx="316975" cy="12700"/>
+          <a:xfrm rot="16200000" flipH="1">
+            <a:off x="6067400" y="4280706"/>
+            <a:ext cx="316975" cy="1"/>
           </a:xfrm>
           <a:prstGeom prst="bentConnector3">
             <a:avLst>
@@ -7341,7 +7341,7 @@
         </p:nvSpPr>
         <p:spPr>
           <a:xfrm>
-            <a:off x="5830792" y="3679608"/>
+            <a:off x="5830791" y="3679608"/>
             <a:ext cx="790192" cy="442612"/>
           </a:xfrm>
           <a:prstGeom prst="rect">
@@ -7455,7 +7455,7 @@
         <p:spPr>
           <a:xfrm flipV="1">
             <a:off x="4944583" y="3900914"/>
-            <a:ext cx="886209" cy="6349"/>
+            <a:ext cx="886208" cy="6349"/>
           </a:xfrm>
           <a:prstGeom prst="bentConnector3">
             <a:avLst>
@@ -8001,11 +8001,11 @@
             <a:avLst/>
           </a:prstGeom>
           <a:solidFill>
-            <a:srgbClr val="00B050"/>
+            <a:srgbClr val="0070C0"/>
           </a:solidFill>
           <a:ln w="19050">
             <a:solidFill>
-              <a:srgbClr val="00B050"/>
+              <a:srgbClr val="0070C0"/>
             </a:solidFill>
           </a:ln>
           <a:effectLst/>
@@ -8030,7 +8030,7 @@
           <a:p>
             <a:pPr algn="ctr"/>
             <a:r>
-              <a:rPr lang="en-US" sz="1050" dirty="0" smtClean="0">
+              <a:rPr lang="en-US" sz="1050" dirty="0">
                 <a:solidFill>
                   <a:schemeClr val="bg1"/>
                 </a:solidFill>
@@ -8038,14 +8038,14 @@
               <a:t>{abstract}</a:t>
             </a:r>
             <a:br>
-              <a:rPr lang="en-US" sz="1050" dirty="0" smtClean="0">
+              <a:rPr lang="en-US" sz="1050" dirty="0">
                 <a:solidFill>
                   <a:schemeClr val="bg1"/>
                 </a:solidFill>
               </a:rPr>
             </a:br>
             <a:r>
-              <a:rPr lang="en-US" sz="1050" dirty="0" smtClean="0">
+              <a:rPr lang="en-US" sz="1050" dirty="0">
                 <a:solidFill>
                   <a:schemeClr val="bg1"/>
                 </a:solidFill>

</xml_diff>